<commit_message>
Add Dev Guide Architecture
</commit_message>
<xml_diff>
--- a/docs/UML/UMLTemplate.pptx
+++ b/docs/UML/UMLTemplate.pptx
@@ -5,7 +5,8 @@
     <p:sldMasterId id="2147483648" r:id="rId1"/>
   </p:sldMasterIdLst>
   <p:sldIdLst>
-    <p:sldId id="256" r:id="rId2"/>
+    <p:sldId id="257" r:id="rId2"/>
+    <p:sldId id="256" r:id="rId3"/>
   </p:sldIdLst>
   <p:sldSz cx="12192000" cy="6858000"/>
   <p:notesSz cx="6858000" cy="9144000"/>
@@ -104,6 +105,11 @@
       </a:defRPr>
     </a:lvl9pPr>
   </p:defaultTextStyle>
+  <p:extLst>
+    <p:ext uri="{EFAFB233-063F-42B5-8137-9DF3F51BA10A}">
+      <p15:sldGuideLst xmlns:p15="http://schemas.microsoft.com/office/powerpoint/2012/main"/>
+    </p:ext>
+  </p:extLst>
 </p:presentation>
 </file>
 
@@ -3344,6 +3350,555 @@
       </p:grpSpPr>
       <p:sp>
         <p:nvSpPr>
+          <p:cNvPr id="4" name="Rectangle 3">
+            <a:extLst>
+              <a:ext uri="{FF2B5EF4-FFF2-40B4-BE49-F238E27FC236}">
+                <a16:creationId xmlns:a16="http://schemas.microsoft.com/office/drawing/2014/main" id="{7D5DDA7C-1B59-F5DC-ED0A-5234C9D9797A}"/>
+              </a:ext>
+            </a:extLst>
+          </p:cNvPr>
+          <p:cNvSpPr/>
+          <p:nvPr/>
+        </p:nvSpPr>
+        <p:spPr>
+          <a:xfrm>
+            <a:off x="4800600" y="2599673"/>
+            <a:ext cx="1295400" cy="580845"/>
+          </a:xfrm>
+          <a:prstGeom prst="rect">
+            <a:avLst/>
+          </a:prstGeom>
+        </p:spPr>
+        <p:style>
+          <a:lnRef idx="2">
+            <a:schemeClr val="accent1">
+              <a:shade val="15000"/>
+            </a:schemeClr>
+          </a:lnRef>
+          <a:fillRef idx="1">
+            <a:schemeClr val="accent1"/>
+          </a:fillRef>
+          <a:effectRef idx="0">
+            <a:schemeClr val="accent1"/>
+          </a:effectRef>
+          <a:fontRef idx="minor">
+            <a:schemeClr val="lt1"/>
+          </a:fontRef>
+        </p:style>
+        <p:txBody>
+          <a:bodyPr rtlCol="0" anchor="ctr"/>
+          <a:lstStyle/>
+          <a:p>
+            <a:pPr algn="ctr"/>
+            <a:r>
+              <a:rPr lang="en-US" altLang="zh-CN" dirty="0"/>
+              <a:t>UI</a:t>
+            </a:r>
+            <a:endParaRPr lang="zh-CN" altLang="en-US" dirty="0"/>
+          </a:p>
+        </p:txBody>
+      </p:sp>
+      <p:sp>
+        <p:nvSpPr>
+          <p:cNvPr id="5" name="Rectangle 4">
+            <a:extLst>
+              <a:ext uri="{FF2B5EF4-FFF2-40B4-BE49-F238E27FC236}">
+                <a16:creationId xmlns:a16="http://schemas.microsoft.com/office/drawing/2014/main" id="{0DC72150-77F9-0FE1-3F1E-3AFBF0730F8D}"/>
+              </a:ext>
+            </a:extLst>
+          </p:cNvPr>
+          <p:cNvSpPr/>
+          <p:nvPr/>
+        </p:nvSpPr>
+        <p:spPr>
+          <a:xfrm>
+            <a:off x="4072505" y="4140713"/>
+            <a:ext cx="1295400" cy="580845"/>
+          </a:xfrm>
+          <a:prstGeom prst="rect">
+            <a:avLst/>
+          </a:prstGeom>
+        </p:spPr>
+        <p:style>
+          <a:lnRef idx="2">
+            <a:schemeClr val="accent1">
+              <a:shade val="15000"/>
+            </a:schemeClr>
+          </a:lnRef>
+          <a:fillRef idx="1">
+            <a:schemeClr val="accent1"/>
+          </a:fillRef>
+          <a:effectRef idx="0">
+            <a:schemeClr val="accent1"/>
+          </a:effectRef>
+          <a:fontRef idx="minor">
+            <a:schemeClr val="lt1"/>
+          </a:fontRef>
+        </p:style>
+        <p:txBody>
+          <a:bodyPr rtlCol="0" anchor="ctr"/>
+          <a:lstStyle/>
+          <a:p>
+            <a:pPr algn="ctr"/>
+            <a:r>
+              <a:rPr lang="en-US" altLang="zh-CN" dirty="0"/>
+              <a:t>Parser</a:t>
+            </a:r>
+            <a:endParaRPr lang="zh-CN" altLang="en-US" dirty="0"/>
+          </a:p>
+        </p:txBody>
+      </p:sp>
+      <p:sp>
+        <p:nvSpPr>
+          <p:cNvPr id="8" name="Rectangle 7">
+            <a:extLst>
+              <a:ext uri="{FF2B5EF4-FFF2-40B4-BE49-F238E27FC236}">
+                <a16:creationId xmlns:a16="http://schemas.microsoft.com/office/drawing/2014/main" id="{5F383BC3-F86E-DEE8-4F17-DE37CDE44960}"/>
+              </a:ext>
+            </a:extLst>
+          </p:cNvPr>
+          <p:cNvSpPr/>
+          <p:nvPr/>
+        </p:nvSpPr>
+        <p:spPr>
+          <a:xfrm>
+            <a:off x="1666786" y="4140713"/>
+            <a:ext cx="1489395" cy="580845"/>
+          </a:xfrm>
+          <a:prstGeom prst="rect">
+            <a:avLst/>
+          </a:prstGeom>
+        </p:spPr>
+        <p:style>
+          <a:lnRef idx="2">
+            <a:schemeClr val="accent1">
+              <a:shade val="15000"/>
+            </a:schemeClr>
+          </a:lnRef>
+          <a:fillRef idx="1">
+            <a:schemeClr val="accent1"/>
+          </a:fillRef>
+          <a:effectRef idx="0">
+            <a:schemeClr val="accent1"/>
+          </a:effectRef>
+          <a:fontRef idx="minor">
+            <a:schemeClr val="lt1"/>
+          </a:fontRef>
+        </p:style>
+        <p:txBody>
+          <a:bodyPr rtlCol="0" anchor="ctr"/>
+          <a:lstStyle/>
+          <a:p>
+            <a:pPr algn="ctr"/>
+            <a:r>
+              <a:rPr lang="en-US" altLang="zh-CN" dirty="0"/>
+              <a:t>Commands</a:t>
+            </a:r>
+            <a:endParaRPr lang="zh-CN" altLang="en-US" dirty="0"/>
+          </a:p>
+        </p:txBody>
+      </p:sp>
+      <p:sp>
+        <p:nvSpPr>
+          <p:cNvPr id="9" name="Rectangle 8">
+            <a:extLst>
+              <a:ext uri="{FF2B5EF4-FFF2-40B4-BE49-F238E27FC236}">
+                <a16:creationId xmlns:a16="http://schemas.microsoft.com/office/drawing/2014/main" id="{16A3AF2E-335F-BFFA-6A05-C784933ED528}"/>
+              </a:ext>
+            </a:extLst>
+          </p:cNvPr>
+          <p:cNvSpPr/>
+          <p:nvPr/>
+        </p:nvSpPr>
+        <p:spPr>
+          <a:xfrm>
+            <a:off x="2411484" y="2599674"/>
+            <a:ext cx="1489395" cy="580845"/>
+          </a:xfrm>
+          <a:prstGeom prst="rect">
+            <a:avLst/>
+          </a:prstGeom>
+        </p:spPr>
+        <p:style>
+          <a:lnRef idx="2">
+            <a:schemeClr val="accent1">
+              <a:shade val="15000"/>
+            </a:schemeClr>
+          </a:lnRef>
+          <a:fillRef idx="1">
+            <a:schemeClr val="accent1"/>
+          </a:fillRef>
+          <a:effectRef idx="0">
+            <a:schemeClr val="accent1"/>
+          </a:effectRef>
+          <a:fontRef idx="minor">
+            <a:schemeClr val="lt1"/>
+          </a:fontRef>
+        </p:style>
+        <p:txBody>
+          <a:bodyPr rtlCol="0" anchor="ctr"/>
+          <a:lstStyle/>
+          <a:p>
+            <a:pPr algn="ctr"/>
+            <a:r>
+              <a:rPr lang="en-US" altLang="zh-CN" dirty="0"/>
+              <a:t>Quizhub</a:t>
+            </a:r>
+            <a:endParaRPr lang="zh-CN" altLang="en-US" dirty="0"/>
+          </a:p>
+        </p:txBody>
+      </p:sp>
+      <p:sp>
+        <p:nvSpPr>
+          <p:cNvPr id="16" name="Rectangle 15">
+            <a:extLst>
+              <a:ext uri="{FF2B5EF4-FFF2-40B4-BE49-F238E27FC236}">
+                <a16:creationId xmlns:a16="http://schemas.microsoft.com/office/drawing/2014/main" id="{ACEA6040-BCC6-F521-1F42-71772FF370D7}"/>
+              </a:ext>
+            </a:extLst>
+          </p:cNvPr>
+          <p:cNvSpPr/>
+          <p:nvPr/>
+        </p:nvSpPr>
+        <p:spPr>
+          <a:xfrm>
+            <a:off x="2411484" y="1349056"/>
+            <a:ext cx="1489395" cy="580845"/>
+          </a:xfrm>
+          <a:prstGeom prst="rect">
+            <a:avLst/>
+          </a:prstGeom>
+          <a:solidFill>
+            <a:schemeClr val="accent3"/>
+          </a:solidFill>
+        </p:spPr>
+        <p:style>
+          <a:lnRef idx="2">
+            <a:schemeClr val="accent1">
+              <a:shade val="15000"/>
+            </a:schemeClr>
+          </a:lnRef>
+          <a:fillRef idx="1">
+            <a:schemeClr val="accent1"/>
+          </a:fillRef>
+          <a:effectRef idx="0">
+            <a:schemeClr val="accent1"/>
+          </a:effectRef>
+          <a:fontRef idx="minor">
+            <a:schemeClr val="lt1"/>
+          </a:fontRef>
+        </p:style>
+        <p:txBody>
+          <a:bodyPr rtlCol="0" anchor="ctr"/>
+          <a:lstStyle/>
+          <a:p>
+            <a:pPr algn="ctr"/>
+            <a:r>
+              <a:rPr lang="en-US" altLang="zh-CN" dirty="0"/>
+              <a:t>Storage</a:t>
+            </a:r>
+            <a:endParaRPr lang="zh-CN" altLang="en-US" dirty="0"/>
+          </a:p>
+        </p:txBody>
+      </p:sp>
+      <p:cxnSp>
+        <p:nvCxnSpPr>
+          <p:cNvPr id="19" name="Straight Arrow Connector 18">
+            <a:extLst>
+              <a:ext uri="{FF2B5EF4-FFF2-40B4-BE49-F238E27FC236}">
+                <a16:creationId xmlns:a16="http://schemas.microsoft.com/office/drawing/2014/main" id="{E30AF913-EBB2-9492-420D-C9CD82D23C96}"/>
+              </a:ext>
+            </a:extLst>
+          </p:cNvPr>
+          <p:cNvCxnSpPr>
+            <a:cxnSpLocks/>
+            <a:stCxn id="9" idx="3"/>
+            <a:endCxn id="4" idx="1"/>
+          </p:cNvCxnSpPr>
+          <p:nvPr/>
+        </p:nvCxnSpPr>
+        <p:spPr>
+          <a:xfrm flipV="1">
+            <a:off x="3900879" y="2890096"/>
+            <a:ext cx="899721" cy="1"/>
+          </a:xfrm>
+          <a:prstGeom prst="straightConnector1">
+            <a:avLst/>
+          </a:prstGeom>
+          <a:ln>
+            <a:tailEnd type="triangle"/>
+          </a:ln>
+        </p:spPr>
+        <p:style>
+          <a:lnRef idx="1">
+            <a:schemeClr val="accent1"/>
+          </a:lnRef>
+          <a:fillRef idx="0">
+            <a:schemeClr val="accent1"/>
+          </a:fillRef>
+          <a:effectRef idx="0">
+            <a:schemeClr val="accent1"/>
+          </a:effectRef>
+          <a:fontRef idx="minor">
+            <a:schemeClr val="tx1"/>
+          </a:fontRef>
+        </p:style>
+      </p:cxnSp>
+      <p:cxnSp>
+        <p:nvCxnSpPr>
+          <p:cNvPr id="27" name="Straight Arrow Connector 26">
+            <a:extLst>
+              <a:ext uri="{FF2B5EF4-FFF2-40B4-BE49-F238E27FC236}">
+                <a16:creationId xmlns:a16="http://schemas.microsoft.com/office/drawing/2014/main" id="{3A67944E-BC4E-3A96-5A9E-DA0895A2B0DD}"/>
+              </a:ext>
+            </a:extLst>
+          </p:cNvPr>
+          <p:cNvCxnSpPr>
+            <a:stCxn id="4" idx="2"/>
+            <a:endCxn id="5" idx="0"/>
+          </p:cNvCxnSpPr>
+          <p:nvPr/>
+        </p:nvCxnSpPr>
+        <p:spPr>
+          <a:xfrm flipH="1">
+            <a:off x="4720205" y="3180518"/>
+            <a:ext cx="728095" cy="960195"/>
+          </a:xfrm>
+          <a:prstGeom prst="straightConnector1">
+            <a:avLst/>
+          </a:prstGeom>
+          <a:ln>
+            <a:tailEnd type="triangle"/>
+          </a:ln>
+        </p:spPr>
+        <p:style>
+          <a:lnRef idx="1">
+            <a:schemeClr val="accent1"/>
+          </a:lnRef>
+          <a:fillRef idx="0">
+            <a:schemeClr val="accent1"/>
+          </a:fillRef>
+          <a:effectRef idx="0">
+            <a:schemeClr val="accent1"/>
+          </a:effectRef>
+          <a:fontRef idx="minor">
+            <a:schemeClr val="tx1"/>
+          </a:fontRef>
+        </p:style>
+      </p:cxnSp>
+      <p:cxnSp>
+        <p:nvCxnSpPr>
+          <p:cNvPr id="29" name="Straight Arrow Connector 28">
+            <a:extLst>
+              <a:ext uri="{FF2B5EF4-FFF2-40B4-BE49-F238E27FC236}">
+                <a16:creationId xmlns:a16="http://schemas.microsoft.com/office/drawing/2014/main" id="{DC8CE634-4612-C34F-469A-69A90CF19D3A}"/>
+              </a:ext>
+            </a:extLst>
+          </p:cNvPr>
+          <p:cNvCxnSpPr>
+            <a:stCxn id="5" idx="1"/>
+            <a:endCxn id="8" idx="3"/>
+          </p:cNvCxnSpPr>
+          <p:nvPr/>
+        </p:nvCxnSpPr>
+        <p:spPr>
+          <a:xfrm flipH="1">
+            <a:off x="3156181" y="4431136"/>
+            <a:ext cx="916324" cy="0"/>
+          </a:xfrm>
+          <a:prstGeom prst="straightConnector1">
+            <a:avLst/>
+          </a:prstGeom>
+          <a:ln>
+            <a:tailEnd type="triangle"/>
+          </a:ln>
+        </p:spPr>
+        <p:style>
+          <a:lnRef idx="1">
+            <a:schemeClr val="accent1"/>
+          </a:lnRef>
+          <a:fillRef idx="0">
+            <a:schemeClr val="accent1"/>
+          </a:fillRef>
+          <a:effectRef idx="0">
+            <a:schemeClr val="accent1"/>
+          </a:effectRef>
+          <a:fontRef idx="minor">
+            <a:schemeClr val="tx1"/>
+          </a:fontRef>
+        </p:style>
+      </p:cxnSp>
+      <p:cxnSp>
+        <p:nvCxnSpPr>
+          <p:cNvPr id="31" name="Straight Arrow Connector 30">
+            <a:extLst>
+              <a:ext uri="{FF2B5EF4-FFF2-40B4-BE49-F238E27FC236}">
+                <a16:creationId xmlns:a16="http://schemas.microsoft.com/office/drawing/2014/main" id="{80565206-85D0-D54D-3E77-6D2A0E0A5578}"/>
+              </a:ext>
+            </a:extLst>
+          </p:cNvPr>
+          <p:cNvCxnSpPr>
+            <a:stCxn id="8" idx="0"/>
+            <a:endCxn id="9" idx="2"/>
+          </p:cNvCxnSpPr>
+          <p:nvPr/>
+        </p:nvCxnSpPr>
+        <p:spPr>
+          <a:xfrm flipV="1">
+            <a:off x="2411484" y="3180519"/>
+            <a:ext cx="744698" cy="960194"/>
+          </a:xfrm>
+          <a:prstGeom prst="straightConnector1">
+            <a:avLst/>
+          </a:prstGeom>
+          <a:ln>
+            <a:tailEnd type="triangle"/>
+          </a:ln>
+        </p:spPr>
+        <p:style>
+          <a:lnRef idx="1">
+            <a:schemeClr val="accent1"/>
+          </a:lnRef>
+          <a:fillRef idx="0">
+            <a:schemeClr val="accent1"/>
+          </a:fillRef>
+          <a:effectRef idx="0">
+            <a:schemeClr val="accent1"/>
+          </a:effectRef>
+          <a:fontRef idx="minor">
+            <a:schemeClr val="tx1"/>
+          </a:fontRef>
+        </p:style>
+      </p:cxnSp>
+      <p:cxnSp>
+        <p:nvCxnSpPr>
+          <p:cNvPr id="37" name="Straight Arrow Connector 36">
+            <a:extLst>
+              <a:ext uri="{FF2B5EF4-FFF2-40B4-BE49-F238E27FC236}">
+                <a16:creationId xmlns:a16="http://schemas.microsoft.com/office/drawing/2014/main" id="{9B33ADD9-73E8-B254-67A4-01A40F75F195}"/>
+              </a:ext>
+            </a:extLst>
+          </p:cNvPr>
+          <p:cNvCxnSpPr>
+            <a:stCxn id="9" idx="0"/>
+            <a:endCxn id="16" idx="2"/>
+          </p:cNvCxnSpPr>
+          <p:nvPr/>
+        </p:nvCxnSpPr>
+        <p:spPr>
+          <a:xfrm flipV="1">
+            <a:off x="3156182" y="1929901"/>
+            <a:ext cx="0" cy="669773"/>
+          </a:xfrm>
+          <a:prstGeom prst="straightConnector1">
+            <a:avLst/>
+          </a:prstGeom>
+          <a:ln>
+            <a:prstDash val="lgDash"/>
+            <a:headEnd type="triangle"/>
+            <a:tailEnd type="triangle"/>
+          </a:ln>
+        </p:spPr>
+        <p:style>
+          <a:lnRef idx="1">
+            <a:schemeClr val="accent1"/>
+          </a:lnRef>
+          <a:fillRef idx="0">
+            <a:schemeClr val="accent1"/>
+          </a:fillRef>
+          <a:effectRef idx="0">
+            <a:schemeClr val="accent1"/>
+          </a:effectRef>
+          <a:fontRef idx="minor">
+            <a:schemeClr val="tx1"/>
+          </a:fontRef>
+        </p:style>
+      </p:cxnSp>
+      <p:sp>
+        <p:nvSpPr>
+          <p:cNvPr id="42" name="Rectangle 41">
+            <a:extLst>
+              <a:ext uri="{FF2B5EF4-FFF2-40B4-BE49-F238E27FC236}">
+                <a16:creationId xmlns:a16="http://schemas.microsoft.com/office/drawing/2014/main" id="{99D03F18-B10F-BCC3-7CA0-3C9BACBC9C89}"/>
+              </a:ext>
+            </a:extLst>
+          </p:cNvPr>
+          <p:cNvSpPr/>
+          <p:nvPr/>
+        </p:nvSpPr>
+        <p:spPr>
+          <a:xfrm>
+            <a:off x="4800600" y="1349055"/>
+            <a:ext cx="1489395" cy="580845"/>
+          </a:xfrm>
+          <a:prstGeom prst="rect">
+            <a:avLst/>
+          </a:prstGeom>
+          <a:solidFill>
+            <a:schemeClr val="accent3"/>
+          </a:solidFill>
+        </p:spPr>
+        <p:style>
+          <a:lnRef idx="2">
+            <a:schemeClr val="accent1">
+              <a:shade val="15000"/>
+            </a:schemeClr>
+          </a:lnRef>
+          <a:fillRef idx="1">
+            <a:schemeClr val="accent1"/>
+          </a:fillRef>
+          <a:effectRef idx="0">
+            <a:schemeClr val="accent1"/>
+          </a:effectRef>
+          <a:fontRef idx="minor">
+            <a:schemeClr val="lt1"/>
+          </a:fontRef>
+        </p:style>
+        <p:txBody>
+          <a:bodyPr rtlCol="0" anchor="ctr"/>
+          <a:lstStyle/>
+          <a:p>
+            <a:pPr algn="ctr"/>
+            <a:r>
+              <a:rPr lang="en-US" altLang="zh-CN" dirty="0"/>
+              <a:t>Utility Classes</a:t>
+            </a:r>
+            <a:endParaRPr lang="zh-CN" altLang="en-US" dirty="0"/>
+          </a:p>
+        </p:txBody>
+      </p:sp>
+    </p:spTree>
+    <p:extLst>
+      <p:ext uri="{BB962C8B-B14F-4D97-AF65-F5344CB8AC3E}">
+        <p14:creationId xmlns:p14="http://schemas.microsoft.com/office/powerpoint/2010/main" val="3303223185"/>
+      </p:ext>
+    </p:extLst>
+  </p:cSld>
+  <p:clrMapOvr>
+    <a:masterClrMapping/>
+  </p:clrMapOvr>
+</p:sld>
+</file>
+
+<file path=ppt/slides/slide2.xml><?xml version="1.0" encoding="utf-8"?>
+<p:sld xmlns:a="http://schemas.openxmlformats.org/drawingml/2006/main" xmlns:r="http://schemas.openxmlformats.org/officeDocument/2006/relationships" xmlns:p="http://schemas.openxmlformats.org/presentationml/2006/main">
+  <p:cSld>
+    <p:spTree>
+      <p:nvGrpSpPr>
+        <p:cNvPr id="1" name=""/>
+        <p:cNvGrpSpPr/>
+        <p:nvPr/>
+      </p:nvGrpSpPr>
+      <p:grpSpPr>
+        <a:xfrm>
+          <a:off x="0" y="0"/>
+          <a:ext cx="0" cy="0"/>
+          <a:chOff x="0" y="0"/>
+          <a:chExt cx="0" cy="0"/>
+        </a:xfrm>
+      </p:grpSpPr>
+      <p:sp>
+        <p:nvSpPr>
           <p:cNvPr id="5" name="Rectangle 4">
             <a:extLst>
               <a:ext uri="{FF2B5EF4-FFF2-40B4-BE49-F238E27FC236}">

</xml_diff>

<commit_message>
Add UI component of developer guide
</commit_message>
<xml_diff>
--- a/docs/UML/UMLTemplate.pptx
+++ b/docs/UML/UMLTemplate.pptx
@@ -262,7 +262,7 @@
           <a:p>
             <a:fld id="{C96E87D9-CDEE-4B78-937B-32FC4ECB58CD}" type="datetimeFigureOut">
               <a:rPr lang="zh-CN" altLang="en-US" smtClean="0"/>
-              <a:t>2023/10/24</a:t>
+              <a:t>2023/10/26</a:t>
             </a:fld>
             <a:endParaRPr lang="zh-CN" altLang="en-US"/>
           </a:p>
@@ -462,7 +462,7 @@
           <a:p>
             <a:fld id="{C96E87D9-CDEE-4B78-937B-32FC4ECB58CD}" type="datetimeFigureOut">
               <a:rPr lang="zh-CN" altLang="en-US" smtClean="0"/>
-              <a:t>2023/10/24</a:t>
+              <a:t>2023/10/26</a:t>
             </a:fld>
             <a:endParaRPr lang="zh-CN" altLang="en-US"/>
           </a:p>
@@ -672,7 +672,7 @@
           <a:p>
             <a:fld id="{C96E87D9-CDEE-4B78-937B-32FC4ECB58CD}" type="datetimeFigureOut">
               <a:rPr lang="zh-CN" altLang="en-US" smtClean="0"/>
-              <a:t>2023/10/24</a:t>
+              <a:t>2023/10/26</a:t>
             </a:fld>
             <a:endParaRPr lang="zh-CN" altLang="en-US"/>
           </a:p>
@@ -872,7 +872,7 @@
           <a:p>
             <a:fld id="{C96E87D9-CDEE-4B78-937B-32FC4ECB58CD}" type="datetimeFigureOut">
               <a:rPr lang="zh-CN" altLang="en-US" smtClean="0"/>
-              <a:t>2023/10/24</a:t>
+              <a:t>2023/10/26</a:t>
             </a:fld>
             <a:endParaRPr lang="zh-CN" altLang="en-US"/>
           </a:p>
@@ -1148,7 +1148,7 @@
           <a:p>
             <a:fld id="{C96E87D9-CDEE-4B78-937B-32FC4ECB58CD}" type="datetimeFigureOut">
               <a:rPr lang="zh-CN" altLang="en-US" smtClean="0"/>
-              <a:t>2023/10/24</a:t>
+              <a:t>2023/10/26</a:t>
             </a:fld>
             <a:endParaRPr lang="zh-CN" altLang="en-US"/>
           </a:p>
@@ -1416,7 +1416,7 @@
           <a:p>
             <a:fld id="{C96E87D9-CDEE-4B78-937B-32FC4ECB58CD}" type="datetimeFigureOut">
               <a:rPr lang="zh-CN" altLang="en-US" smtClean="0"/>
-              <a:t>2023/10/24</a:t>
+              <a:t>2023/10/26</a:t>
             </a:fld>
             <a:endParaRPr lang="zh-CN" altLang="en-US"/>
           </a:p>
@@ -1831,7 +1831,7 @@
           <a:p>
             <a:fld id="{C96E87D9-CDEE-4B78-937B-32FC4ECB58CD}" type="datetimeFigureOut">
               <a:rPr lang="zh-CN" altLang="en-US" smtClean="0"/>
-              <a:t>2023/10/24</a:t>
+              <a:t>2023/10/26</a:t>
             </a:fld>
             <a:endParaRPr lang="zh-CN" altLang="en-US"/>
           </a:p>
@@ -1973,7 +1973,7 @@
           <a:p>
             <a:fld id="{C96E87D9-CDEE-4B78-937B-32FC4ECB58CD}" type="datetimeFigureOut">
               <a:rPr lang="zh-CN" altLang="en-US" smtClean="0"/>
-              <a:t>2023/10/24</a:t>
+              <a:t>2023/10/26</a:t>
             </a:fld>
             <a:endParaRPr lang="zh-CN" altLang="en-US"/>
           </a:p>
@@ -2086,7 +2086,7 @@
           <a:p>
             <a:fld id="{C96E87D9-CDEE-4B78-937B-32FC4ECB58CD}" type="datetimeFigureOut">
               <a:rPr lang="zh-CN" altLang="en-US" smtClean="0"/>
-              <a:t>2023/10/24</a:t>
+              <a:t>2023/10/26</a:t>
             </a:fld>
             <a:endParaRPr lang="zh-CN" altLang="en-US"/>
           </a:p>
@@ -2399,7 +2399,7 @@
           <a:p>
             <a:fld id="{C96E87D9-CDEE-4B78-937B-32FC4ECB58CD}" type="datetimeFigureOut">
               <a:rPr lang="zh-CN" altLang="en-US" smtClean="0"/>
-              <a:t>2023/10/24</a:t>
+              <a:t>2023/10/26</a:t>
             </a:fld>
             <a:endParaRPr lang="zh-CN" altLang="en-US"/>
           </a:p>
@@ -2688,7 +2688,7 @@
           <a:p>
             <a:fld id="{C96E87D9-CDEE-4B78-937B-32FC4ECB58CD}" type="datetimeFigureOut">
               <a:rPr lang="zh-CN" altLang="en-US" smtClean="0"/>
-              <a:t>2023/10/24</a:t>
+              <a:t>2023/10/26</a:t>
             </a:fld>
             <a:endParaRPr lang="zh-CN" altLang="en-US"/>
           </a:p>
@@ -2931,7 +2931,7 @@
           <a:p>
             <a:fld id="{C96E87D9-CDEE-4B78-937B-32FC4ECB58CD}" type="datetimeFigureOut">
               <a:rPr lang="zh-CN" altLang="en-US" smtClean="0"/>
-              <a:t>2023/10/24</a:t>
+              <a:t>2023/10/26</a:t>
             </a:fld>
             <a:endParaRPr lang="zh-CN" altLang="en-US"/>
           </a:p>

</xml_diff>